<commit_message>
Update PPT with new images
</commit_message>
<xml_diff>
--- a/PPT/image_ppt.pptx
+++ b/PPT/image_ppt.pptx
@@ -7,8 +7,6 @@
   <p:sldIdLst>
     <p:sldId id="256" r:id="rId7"/>
     <p:sldId id="257" r:id="rId8"/>
-    <p:sldId id="258" r:id="rId9"/>
-    <p:sldId id="259" r:id="rId10"/>
   </p:sldIdLst>
   <p:sldSz cx="9144000" cy="6858000" type="screen4x3"/>
   <p:notesSz cx="6858000" cy="9144000"/>
@@ -3093,7 +3091,7 @@
       <p:grpSpPr/>
       <p:pic>
         <p:nvPicPr>
-          <p:cNvPr id="2" name="Picture 1" descr="image1.jpg"/>
+          <p:cNvPr id="2" name="Picture 1" descr="image.jpg"/>
           <p:cNvPicPr>
             <a:picLocks noChangeAspect="1"/>
           </p:cNvPicPr>
@@ -3107,8 +3105,8 @@
         </p:blipFill>
         <p:spPr>
           <a:xfrm>
-            <a:off x="0" y="0"/>
-            <a:ext cx="4572000" cy="6858000"/>
+            <a:off x="457200" y="457200"/>
+            <a:ext cx="3886200" cy="5943600"/>
           </a:xfrm>
           <a:prstGeom prst="rect">
             <a:avLst/>
@@ -3131,8 +3129,8 @@
         </p:blipFill>
         <p:spPr>
           <a:xfrm>
-            <a:off x="4572000" y="0"/>
-            <a:ext cx="4572000" cy="6858000"/>
+            <a:off x="4800600" y="457200"/>
+            <a:ext cx="3886200" cy="5943600"/>
           </a:xfrm>
           <a:prstGeom prst="rect">
             <a:avLst/>
@@ -3159,72 +3157,6 @@
       <p:grpSpPr/>
       <p:pic>
         <p:nvPicPr>
-          <p:cNvPr id="2" name="Picture 1" descr="image2.jpg"/>
-          <p:cNvPicPr>
-            <a:picLocks noChangeAspect="1"/>
-          </p:cNvPicPr>
-          <p:nvPr/>
-        </p:nvPicPr>
-        <p:blipFill>
-          <a:blip r:embed="rId2"/>
-          <a:stretch>
-            <a:fillRect/>
-          </a:stretch>
-        </p:blipFill>
-        <p:spPr>
-          <a:xfrm>
-            <a:off x="0" y="0"/>
-            <a:ext cx="4572000" cy="6858000"/>
-          </a:xfrm>
-          <a:prstGeom prst="rect">
-            <a:avLst/>
-          </a:prstGeom>
-        </p:spPr>
-      </p:pic>
-      <p:pic>
-        <p:nvPicPr>
-          <p:cNvPr id="3" name="Picture 2" descr="image3.jpg"/>
-          <p:cNvPicPr>
-            <a:picLocks noChangeAspect="1"/>
-          </p:cNvPicPr>
-          <p:nvPr/>
-        </p:nvPicPr>
-        <p:blipFill>
-          <a:blip r:embed="rId3"/>
-          <a:stretch>
-            <a:fillRect/>
-          </a:stretch>
-        </p:blipFill>
-        <p:spPr>
-          <a:xfrm>
-            <a:off x="4572000" y="0"/>
-            <a:ext cx="4572000" cy="6858000"/>
-          </a:xfrm>
-          <a:prstGeom prst="rect">
-            <a:avLst/>
-          </a:prstGeom>
-        </p:spPr>
-      </p:pic>
-    </p:spTree>
-  </p:cSld>
-  <p:clrMapOvr>
-    <a:masterClrMapping/>
-  </p:clrMapOvr>
-</p:sld>
-</file>
-
-<file path=ppt/slides/slide3.xml><?xml version="1.0" encoding="utf-8"?>
-<p:sld xmlns:a="http://schemas.openxmlformats.org/drawingml/2006/main" xmlns:p="http://schemas.openxmlformats.org/presentationml/2006/main" xmlns:r="http://schemas.openxmlformats.org/officeDocument/2006/relationships">
-  <p:cSld>
-    <p:spTree>
-      <p:nvGrpSpPr>
-        <p:cNvPr id="1" name=""/>
-        <p:cNvGrpSpPr/>
-        <p:nvPr/>
-      </p:nvGrpSpPr>
-      <p:grpSpPr/>
-      <p:pic>
-        <p:nvPicPr>
           <p:cNvPr id="2" name="Picture 1" descr="image3.jpg"/>
           <p:cNvPicPr>
             <a:picLocks noChangeAspect="1"/>
@@ -3239,8 +3171,8 @@
         </p:blipFill>
         <p:spPr>
           <a:xfrm>
-            <a:off x="0" y="0"/>
-            <a:ext cx="4572000" cy="6858000"/>
+            <a:off x="457200" y="457200"/>
+            <a:ext cx="3886200" cy="5943600"/>
           </a:xfrm>
           <a:prstGeom prst="rect">
             <a:avLst/>
@@ -3263,50 +3195,8 @@
         </p:blipFill>
         <p:spPr>
           <a:xfrm>
-            <a:off x="4572000" y="0"/>
-            <a:ext cx="4572000" cy="6858000"/>
-          </a:xfrm>
-          <a:prstGeom prst="rect">
-            <a:avLst/>
-          </a:prstGeom>
-        </p:spPr>
-      </p:pic>
-    </p:spTree>
-  </p:cSld>
-  <p:clrMapOvr>
-    <a:masterClrMapping/>
-  </p:clrMapOvr>
-</p:sld>
-</file>
-
-<file path=ppt/slides/slide4.xml><?xml version="1.0" encoding="utf-8"?>
-<p:sld xmlns:a="http://schemas.openxmlformats.org/drawingml/2006/main" xmlns:p="http://schemas.openxmlformats.org/presentationml/2006/main" xmlns:r="http://schemas.openxmlformats.org/officeDocument/2006/relationships">
-  <p:cSld>
-    <p:spTree>
-      <p:nvGrpSpPr>
-        <p:cNvPr id="1" name=""/>
-        <p:cNvGrpSpPr/>
-        <p:nvPr/>
-      </p:nvGrpSpPr>
-      <p:grpSpPr/>
-      <p:pic>
-        <p:nvPicPr>
-          <p:cNvPr id="2" name="Picture 1" descr="image2.jpg"/>
-          <p:cNvPicPr>
-            <a:picLocks noChangeAspect="1"/>
-          </p:cNvPicPr>
-          <p:nvPr/>
-        </p:nvPicPr>
-        <p:blipFill>
-          <a:blip r:embed="rId2"/>
-          <a:stretch>
-            <a:fillRect/>
-          </a:stretch>
-        </p:blipFill>
-        <p:spPr>
-          <a:xfrm>
-            <a:off x="0" y="0"/>
-            <a:ext cx="4572000" cy="6858000"/>
+            <a:off x="4800600" y="457200"/>
+            <a:ext cx="3886200" cy="5943600"/>
           </a:xfrm>
           <a:prstGeom prst="rect">
             <a:avLst/>

</xml_diff>

<commit_message>
added some images to test the script
</commit_message>
<xml_diff>
--- a/PPT/image_ppt.pptx
+++ b/PPT/image_ppt.pptx
@@ -3091,7 +3091,7 @@
       <p:grpSpPr/>
       <p:pic>
         <p:nvPicPr>
-          <p:cNvPr id="2" name="Picture 1" descr="image1.jpg"/>
+          <p:cNvPr id="2" name="Picture 1" descr="download1.jpg"/>
           <p:cNvPicPr>
             <a:picLocks noChangeAspect="1"/>
           </p:cNvPicPr>
@@ -3105,8 +3105,8 @@
         </p:blipFill>
         <p:spPr>
           <a:xfrm>
-            <a:off x="0" y="462935"/>
-            <a:ext cx="9144000" cy="5932129"/>
+            <a:off x="0" y="615462"/>
+            <a:ext cx="9144000" cy="5627076"/>
           </a:xfrm>
           <a:prstGeom prst="rect">
             <a:avLst/>
@@ -3133,7 +3133,7 @@
       <p:grpSpPr/>
       <p:pic>
         <p:nvPicPr>
-          <p:cNvPr id="2" name="Picture 1" descr="image2.jpg"/>
+          <p:cNvPr id="2" name="Picture 1" descr="image1.jpg"/>
           <p:cNvPicPr>
             <a:picLocks noChangeAspect="1"/>
           </p:cNvPicPr>
@@ -3147,8 +3147,8 @@
         </p:blipFill>
         <p:spPr>
           <a:xfrm>
-            <a:off x="0" y="4413"/>
-            <a:ext cx="9144000" cy="6849173"/>
+            <a:off x="0" y="462935"/>
+            <a:ext cx="9144000" cy="5932129"/>
           </a:xfrm>
           <a:prstGeom prst="rect">
             <a:avLst/>

</xml_diff>